<commit_message>
minor update in table1 and mini's new result
</commit_message>
<xml_diff>
--- a/progress_2025_10_17.pptx
+++ b/progress_2025_10_17.pptx
@@ -5,7 +5,7 @@
     <p:sldMasterId id="2147483648" r:id="rId1"/>
   </p:sldMasterIdLst>
   <p:notesMasterIdLst>
-    <p:notesMasterId r:id="rId13"/>
+    <p:notesMasterId r:id="rId17"/>
   </p:notesMasterIdLst>
   <p:sldIdLst>
     <p:sldId id="259" r:id="rId2"/>
@@ -19,6 +19,10 @@
     <p:sldId id="267" r:id="rId10"/>
     <p:sldId id="268" r:id="rId11"/>
     <p:sldId id="269" r:id="rId12"/>
+    <p:sldId id="270" r:id="rId13"/>
+    <p:sldId id="271" r:id="rId14"/>
+    <p:sldId id="273" r:id="rId15"/>
+    <p:sldId id="272" r:id="rId16"/>
   </p:sldIdLst>
   <p:sldSz cx="12192000" cy="6858000"/>
   <p:notesSz cx="6858000" cy="9144000"/>
@@ -336,7 +340,7 @@
           <a:p>
             <a:fld id="{C46C5811-2DE2-4B84-ADDD-AA18B668D868}" type="datetimeFigureOut">
               <a:rPr lang="zh-CN" altLang="en-US" smtClean="0"/>
-              <a:t>2025/10/14</a:t>
+              <a:t>2025/12/25</a:t>
             </a:fld>
             <a:endParaRPr lang="zh-CN" altLang="en-US"/>
           </a:p>
@@ -877,7 +881,7 @@
           <a:p>
             <a:fld id="{BBC31CEB-93DF-4E52-9577-BE779FD85A6A}" type="datetimeFigureOut">
               <a:rPr lang="zh-CN" altLang="en-US" smtClean="0"/>
-              <a:t>2025/10/14</a:t>
+              <a:t>2025/12/25</a:t>
             </a:fld>
             <a:endParaRPr lang="zh-CN" altLang="en-US"/>
           </a:p>
@@ -1077,7 +1081,7 @@
           <a:p>
             <a:fld id="{BBC31CEB-93DF-4E52-9577-BE779FD85A6A}" type="datetimeFigureOut">
               <a:rPr lang="zh-CN" altLang="en-US" smtClean="0"/>
-              <a:t>2025/10/14</a:t>
+              <a:t>2025/12/25</a:t>
             </a:fld>
             <a:endParaRPr lang="zh-CN" altLang="en-US"/>
           </a:p>
@@ -1287,7 +1291,7 @@
           <a:p>
             <a:fld id="{BBC31CEB-93DF-4E52-9577-BE779FD85A6A}" type="datetimeFigureOut">
               <a:rPr lang="zh-CN" altLang="en-US" smtClean="0"/>
-              <a:t>2025/10/14</a:t>
+              <a:t>2025/12/25</a:t>
             </a:fld>
             <a:endParaRPr lang="zh-CN" altLang="en-US"/>
           </a:p>
@@ -1487,7 +1491,7 @@
           <a:p>
             <a:fld id="{BBC31CEB-93DF-4E52-9577-BE779FD85A6A}" type="datetimeFigureOut">
               <a:rPr lang="zh-CN" altLang="en-US" smtClean="0"/>
-              <a:t>2025/10/14</a:t>
+              <a:t>2025/12/25</a:t>
             </a:fld>
             <a:endParaRPr lang="zh-CN" altLang="en-US"/>
           </a:p>
@@ -1763,7 +1767,7 @@
           <a:p>
             <a:fld id="{BBC31CEB-93DF-4E52-9577-BE779FD85A6A}" type="datetimeFigureOut">
               <a:rPr lang="zh-CN" altLang="en-US" smtClean="0"/>
-              <a:t>2025/10/14</a:t>
+              <a:t>2025/12/25</a:t>
             </a:fld>
             <a:endParaRPr lang="zh-CN" altLang="en-US"/>
           </a:p>
@@ -2031,7 +2035,7 @@
           <a:p>
             <a:fld id="{BBC31CEB-93DF-4E52-9577-BE779FD85A6A}" type="datetimeFigureOut">
               <a:rPr lang="zh-CN" altLang="en-US" smtClean="0"/>
-              <a:t>2025/10/14</a:t>
+              <a:t>2025/12/25</a:t>
             </a:fld>
             <a:endParaRPr lang="zh-CN" altLang="en-US"/>
           </a:p>
@@ -2446,7 +2450,7 @@
           <a:p>
             <a:fld id="{BBC31CEB-93DF-4E52-9577-BE779FD85A6A}" type="datetimeFigureOut">
               <a:rPr lang="zh-CN" altLang="en-US" smtClean="0"/>
-              <a:t>2025/10/14</a:t>
+              <a:t>2025/12/25</a:t>
             </a:fld>
             <a:endParaRPr lang="zh-CN" altLang="en-US"/>
           </a:p>
@@ -2588,7 +2592,7 @@
           <a:p>
             <a:fld id="{BBC31CEB-93DF-4E52-9577-BE779FD85A6A}" type="datetimeFigureOut">
               <a:rPr lang="zh-CN" altLang="en-US" smtClean="0"/>
-              <a:t>2025/10/14</a:t>
+              <a:t>2025/12/25</a:t>
             </a:fld>
             <a:endParaRPr lang="zh-CN" altLang="en-US"/>
           </a:p>
@@ -2701,7 +2705,7 @@
           <a:p>
             <a:fld id="{BBC31CEB-93DF-4E52-9577-BE779FD85A6A}" type="datetimeFigureOut">
               <a:rPr lang="zh-CN" altLang="en-US" smtClean="0"/>
-              <a:t>2025/10/14</a:t>
+              <a:t>2025/12/25</a:t>
             </a:fld>
             <a:endParaRPr lang="zh-CN" altLang="en-US"/>
           </a:p>
@@ -3014,7 +3018,7 @@
           <a:p>
             <a:fld id="{BBC31CEB-93DF-4E52-9577-BE779FD85A6A}" type="datetimeFigureOut">
               <a:rPr lang="zh-CN" altLang="en-US" smtClean="0"/>
-              <a:t>2025/10/14</a:t>
+              <a:t>2025/12/25</a:t>
             </a:fld>
             <a:endParaRPr lang="zh-CN" altLang="en-US"/>
           </a:p>
@@ -3307,7 +3311,7 @@
           <a:p>
             <a:fld id="{BBC31CEB-93DF-4E52-9577-BE779FD85A6A}" type="datetimeFigureOut">
               <a:rPr lang="zh-CN" altLang="en-US" smtClean="0"/>
-              <a:t>2025/10/14</a:t>
+              <a:t>2025/12/25</a:t>
             </a:fld>
             <a:endParaRPr lang="zh-CN" altLang="en-US"/>
           </a:p>
@@ -3550,7 +3554,7 @@
           <a:p>
             <a:fld id="{BBC31CEB-93DF-4E52-9577-BE779FD85A6A}" type="datetimeFigureOut">
               <a:rPr lang="zh-CN" altLang="en-US" smtClean="0"/>
-              <a:t>2025/10/14</a:t>
+              <a:t>2025/12/25</a:t>
             </a:fld>
             <a:endParaRPr lang="zh-CN" altLang="en-US"/>
           </a:p>
@@ -4466,6 +4470,1187 @@
     <p:extLst>
       <p:ext uri="{BB962C8B-B14F-4D97-AF65-F5344CB8AC3E}">
         <p14:creationId xmlns:p14="http://schemas.microsoft.com/office/powerpoint/2010/main" val="3272827009"/>
+      </p:ext>
+    </p:extLst>
+  </p:cSld>
+  <p:clrMapOvr>
+    <a:masterClrMapping/>
+  </p:clrMapOvr>
+</p:sld>
+</file>
+
+<file path=ppt/slides/slide12.xml><?xml version="1.0" encoding="utf-8"?>
+<p:sld xmlns:a="http://schemas.openxmlformats.org/drawingml/2006/main" xmlns:r="http://schemas.openxmlformats.org/officeDocument/2006/relationships" xmlns:p="http://schemas.openxmlformats.org/presentationml/2006/main">
+  <p:cSld>
+    <p:spTree>
+      <p:nvGrpSpPr>
+        <p:cNvPr id="1" name=""/>
+        <p:cNvGrpSpPr/>
+        <p:nvPr/>
+      </p:nvGrpSpPr>
+      <p:grpSpPr>
+        <a:xfrm>
+          <a:off x="0" y="0"/>
+          <a:ext cx="0" cy="0"/>
+          <a:chOff x="0" y="0"/>
+          <a:chExt cx="0" cy="0"/>
+        </a:xfrm>
+      </p:grpSpPr>
+      <p:pic>
+        <p:nvPicPr>
+          <p:cNvPr id="14" name="Picture 13" descr="A close-up of a graph&#10;&#10;AI-generated content may be incorrect.">
+            <a:extLst>
+              <a:ext uri="{FF2B5EF4-FFF2-40B4-BE49-F238E27FC236}">
+                <a16:creationId xmlns:a16="http://schemas.microsoft.com/office/drawing/2014/main" id="{4243CA62-6D49-5CAD-289B-CEF3DB69067E}"/>
+              </a:ext>
+            </a:extLst>
+          </p:cNvPr>
+          <p:cNvPicPr>
+            <a:picLocks noChangeAspect="1"/>
+          </p:cNvPicPr>
+          <p:nvPr/>
+        </p:nvPicPr>
+        <p:blipFill>
+          <a:blip r:embed="rId2"/>
+          <a:stretch>
+            <a:fillRect/>
+          </a:stretch>
+        </p:blipFill>
+        <p:spPr>
+          <a:xfrm>
+            <a:off x="201970" y="1664454"/>
+            <a:ext cx="8516539" cy="4620270"/>
+          </a:xfrm>
+          <a:prstGeom prst="rect">
+            <a:avLst/>
+          </a:prstGeom>
+        </p:spPr>
+      </p:pic>
+      <p:sp>
+        <p:nvSpPr>
+          <p:cNvPr id="2" name="Title 1">
+            <a:extLst>
+              <a:ext uri="{FF2B5EF4-FFF2-40B4-BE49-F238E27FC236}">
+                <a16:creationId xmlns:a16="http://schemas.microsoft.com/office/drawing/2014/main" id="{3B162E84-25FE-41AE-13F7-6E24CA584A40}"/>
+              </a:ext>
+            </a:extLst>
+          </p:cNvPr>
+          <p:cNvSpPr>
+            <a:spLocks noGrp="1"/>
+          </p:cNvSpPr>
+          <p:nvPr>
+            <p:ph type="title"/>
+          </p:nvPr>
+        </p:nvSpPr>
+        <p:spPr/>
+        <p:txBody>
+          <a:bodyPr/>
+          <a:lstStyle/>
+          <a:p>
+            <a:r>
+              <a:rPr lang="en-US" altLang="zh-CN" dirty="0"/>
+              <a:t>C_ID10 vs ID10</a:t>
+            </a:r>
+            <a:endParaRPr lang="zh-CN" altLang="en-US" dirty="0"/>
+          </a:p>
+        </p:txBody>
+      </p:sp>
+      <p:sp>
+        <p:nvSpPr>
+          <p:cNvPr id="7" name="TextBox 6">
+            <a:extLst>
+              <a:ext uri="{FF2B5EF4-FFF2-40B4-BE49-F238E27FC236}">
+                <a16:creationId xmlns:a16="http://schemas.microsoft.com/office/drawing/2014/main" id="{F9ECE27F-D00E-9693-F043-BD01C5389B6B}"/>
+              </a:ext>
+            </a:extLst>
+          </p:cNvPr>
+          <p:cNvSpPr txBox="1"/>
+          <p:nvPr/>
+        </p:nvSpPr>
+        <p:spPr>
+          <a:xfrm>
+            <a:off x="690880" y="2065774"/>
+            <a:ext cx="1239520" cy="369332"/>
+          </a:xfrm>
+          <a:prstGeom prst="rect">
+            <a:avLst/>
+          </a:prstGeom>
+          <a:noFill/>
+        </p:spPr>
+        <p:txBody>
+          <a:bodyPr wrap="square">
+            <a:spAutoFit/>
+          </a:bodyPr>
+          <a:lstStyle/>
+          <a:p>
+            <a:r>
+              <a:rPr lang="en-US" altLang="zh-CN" dirty="0"/>
+              <a:t>C_ID10 </a:t>
+            </a:r>
+            <a:endParaRPr lang="zh-CN" altLang="en-US" dirty="0"/>
+          </a:p>
+        </p:txBody>
+      </p:sp>
+      <p:sp>
+        <p:nvSpPr>
+          <p:cNvPr id="9" name="TextBox 8">
+            <a:extLst>
+              <a:ext uri="{FF2B5EF4-FFF2-40B4-BE49-F238E27FC236}">
+                <a16:creationId xmlns:a16="http://schemas.microsoft.com/office/drawing/2014/main" id="{F4AA3AA7-8437-9FA1-24F9-5A59796224A8}"/>
+              </a:ext>
+            </a:extLst>
+          </p:cNvPr>
+          <p:cNvSpPr txBox="1"/>
+          <p:nvPr/>
+        </p:nvSpPr>
+        <p:spPr>
+          <a:xfrm>
+            <a:off x="741680" y="3549769"/>
+            <a:ext cx="1946656" cy="369332"/>
+          </a:xfrm>
+          <a:prstGeom prst="rect">
+            <a:avLst/>
+          </a:prstGeom>
+          <a:noFill/>
+        </p:spPr>
+        <p:txBody>
+          <a:bodyPr wrap="square">
+            <a:spAutoFit/>
+          </a:bodyPr>
+          <a:lstStyle/>
+          <a:p>
+            <a:r>
+              <a:rPr lang="en-US" altLang="zh-CN" dirty="0"/>
+              <a:t>ID10 cosmic</a:t>
+            </a:r>
+            <a:endParaRPr lang="zh-CN" altLang="en-US" dirty="0"/>
+          </a:p>
+        </p:txBody>
+      </p:sp>
+      <p:sp>
+        <p:nvSpPr>
+          <p:cNvPr id="11" name="TextBox 10">
+            <a:extLst>
+              <a:ext uri="{FF2B5EF4-FFF2-40B4-BE49-F238E27FC236}">
+                <a16:creationId xmlns:a16="http://schemas.microsoft.com/office/drawing/2014/main" id="{2A420FDF-4D78-A1B8-9B49-AAEF02D8040A}"/>
+              </a:ext>
+            </a:extLst>
+          </p:cNvPr>
+          <p:cNvSpPr txBox="1"/>
+          <p:nvPr/>
+        </p:nvSpPr>
+        <p:spPr>
+          <a:xfrm>
+            <a:off x="8718509" y="2990017"/>
+            <a:ext cx="1915160" cy="369332"/>
+          </a:xfrm>
+          <a:prstGeom prst="rect">
+            <a:avLst/>
+          </a:prstGeom>
+          <a:noFill/>
+        </p:spPr>
+        <p:txBody>
+          <a:bodyPr wrap="square">
+            <a:spAutoFit/>
+          </a:bodyPr>
+          <a:lstStyle/>
+          <a:p>
+            <a:pPr algn="l" latinLnBrk="1">
+              <a:buNone/>
+            </a:pPr>
+            <a:r>
+              <a:rPr lang="en-US" altLang="zh-CN" b="0" i="0" dirty="0">
+                <a:solidFill>
+                  <a:srgbClr val="586E75"/>
+                </a:solidFill>
+                <a:effectLst/>
+                <a:latin typeface="Cascadia Code" panose="020B0609020000020004" pitchFamily="49" charset="0"/>
+              </a:rPr>
+              <a:t>0.5285144</a:t>
+            </a:r>
+          </a:p>
+        </p:txBody>
+      </p:sp>
+      <p:sp>
+        <p:nvSpPr>
+          <p:cNvPr id="12" name="TextBox 11">
+            <a:extLst>
+              <a:ext uri="{FF2B5EF4-FFF2-40B4-BE49-F238E27FC236}">
+                <a16:creationId xmlns:a16="http://schemas.microsoft.com/office/drawing/2014/main" id="{B25B312F-68B3-81C4-A35F-1137F50F2FFA}"/>
+              </a:ext>
+            </a:extLst>
+          </p:cNvPr>
+          <p:cNvSpPr txBox="1"/>
+          <p:nvPr/>
+        </p:nvSpPr>
+        <p:spPr>
+          <a:xfrm>
+            <a:off x="8793480" y="5193546"/>
+            <a:ext cx="3398520" cy="646331"/>
+          </a:xfrm>
+          <a:prstGeom prst="rect">
+            <a:avLst/>
+          </a:prstGeom>
+          <a:noFill/>
+        </p:spPr>
+        <p:txBody>
+          <a:bodyPr wrap="square">
+            <a:spAutoFit/>
+          </a:bodyPr>
+          <a:lstStyle/>
+          <a:p>
+            <a:pPr algn="l" latinLnBrk="1">
+              <a:buNone/>
+            </a:pPr>
+            <a:r>
+              <a:rPr lang="en-US" altLang="zh-CN" b="0" i="0" dirty="0">
+                <a:solidFill>
+                  <a:srgbClr val="586E75"/>
+                </a:solidFill>
+                <a:effectLst/>
+                <a:latin typeface="Cascadia Code" panose="020B0609020000020004" pitchFamily="49" charset="0"/>
+              </a:rPr>
+              <a:t>Without Poly T insertion peak: 0.879</a:t>
+            </a:r>
+          </a:p>
+        </p:txBody>
+      </p:sp>
+    </p:spTree>
+    <p:extLst>
+      <p:ext uri="{BB962C8B-B14F-4D97-AF65-F5344CB8AC3E}">
+        <p14:creationId xmlns:p14="http://schemas.microsoft.com/office/powerpoint/2010/main" val="1054784795"/>
+      </p:ext>
+    </p:extLst>
+  </p:cSld>
+  <p:clrMapOvr>
+    <a:masterClrMapping/>
+  </p:clrMapOvr>
+</p:sld>
+</file>
+
+<file path=ppt/slides/slide13.xml><?xml version="1.0" encoding="utf-8"?>
+<p:sld xmlns:a="http://schemas.openxmlformats.org/drawingml/2006/main" xmlns:r="http://schemas.openxmlformats.org/officeDocument/2006/relationships" xmlns:p="http://schemas.openxmlformats.org/presentationml/2006/main">
+  <p:cSld>
+    <p:spTree>
+      <p:nvGrpSpPr>
+        <p:cNvPr id="1" name=""/>
+        <p:cNvGrpSpPr/>
+        <p:nvPr/>
+      </p:nvGrpSpPr>
+      <p:grpSpPr>
+        <a:xfrm>
+          <a:off x="0" y="0"/>
+          <a:ext cx="0" cy="0"/>
+          <a:chOff x="0" y="0"/>
+          <a:chExt cx="0" cy="0"/>
+        </a:xfrm>
+      </p:grpSpPr>
+      <p:sp>
+        <p:nvSpPr>
+          <p:cNvPr id="2" name="Title 1">
+            <a:extLst>
+              <a:ext uri="{FF2B5EF4-FFF2-40B4-BE49-F238E27FC236}">
+                <a16:creationId xmlns:a16="http://schemas.microsoft.com/office/drawing/2014/main" id="{F0314AFD-456A-4D7A-5D3D-29830B5DE7CF}"/>
+              </a:ext>
+            </a:extLst>
+          </p:cNvPr>
+          <p:cNvSpPr>
+            <a:spLocks noGrp="1"/>
+          </p:cNvSpPr>
+          <p:nvPr>
+            <p:ph type="title"/>
+          </p:nvPr>
+        </p:nvSpPr>
+        <p:spPr/>
+        <p:txBody>
+          <a:bodyPr/>
+          <a:lstStyle/>
+          <a:p>
+            <a:r>
+              <a:rPr lang="en-US" altLang="zh-CN" dirty="0"/>
+              <a:t>Novel but split?</a:t>
+            </a:r>
+            <a:endParaRPr lang="zh-CN" altLang="en-US" dirty="0"/>
+          </a:p>
+        </p:txBody>
+      </p:sp>
+      <p:pic>
+        <p:nvPicPr>
+          <p:cNvPr id="5" name="Picture 4" descr="A screenshot of a graph&#10;&#10;AI-generated content may be incorrect.">
+            <a:extLst>
+              <a:ext uri="{FF2B5EF4-FFF2-40B4-BE49-F238E27FC236}">
+                <a16:creationId xmlns:a16="http://schemas.microsoft.com/office/drawing/2014/main" id="{F91B1DE3-71C6-F0EF-206B-DEA97C7BB78E}"/>
+              </a:ext>
+            </a:extLst>
+          </p:cNvPr>
+          <p:cNvPicPr>
+            <a:picLocks noChangeAspect="1"/>
+          </p:cNvPicPr>
+          <p:nvPr/>
+        </p:nvPicPr>
+        <p:blipFill>
+          <a:blip r:embed="rId2"/>
+          <a:stretch>
+            <a:fillRect/>
+          </a:stretch>
+        </p:blipFill>
+        <p:spPr>
+          <a:xfrm>
+            <a:off x="6272718" y="1866768"/>
+            <a:ext cx="5081082" cy="1386151"/>
+          </a:xfrm>
+          <a:prstGeom prst="rect">
+            <a:avLst/>
+          </a:prstGeom>
+        </p:spPr>
+      </p:pic>
+      <p:pic>
+        <p:nvPicPr>
+          <p:cNvPr id="7" name="Picture 6">
+            <a:extLst>
+              <a:ext uri="{FF2B5EF4-FFF2-40B4-BE49-F238E27FC236}">
+                <a16:creationId xmlns:a16="http://schemas.microsoft.com/office/drawing/2014/main" id="{E7066C61-5D23-56EF-661F-76A41A8DFCBF}"/>
+              </a:ext>
+            </a:extLst>
+          </p:cNvPr>
+          <p:cNvPicPr>
+            <a:picLocks noChangeAspect="1"/>
+          </p:cNvPicPr>
+          <p:nvPr/>
+        </p:nvPicPr>
+        <p:blipFill>
+          <a:blip r:embed="rId3"/>
+          <a:stretch>
+            <a:fillRect/>
+          </a:stretch>
+        </p:blipFill>
+        <p:spPr>
+          <a:xfrm>
+            <a:off x="6439757" y="3605082"/>
+            <a:ext cx="4747004" cy="1290852"/>
+          </a:xfrm>
+          <a:prstGeom prst="rect">
+            <a:avLst/>
+          </a:prstGeom>
+        </p:spPr>
+      </p:pic>
+      <p:pic>
+        <p:nvPicPr>
+          <p:cNvPr id="9" name="Picture 8" descr="A rectangular frame with different colored squares&#10;&#10;AI-generated content may be incorrect.">
+            <a:extLst>
+              <a:ext uri="{FF2B5EF4-FFF2-40B4-BE49-F238E27FC236}">
+                <a16:creationId xmlns:a16="http://schemas.microsoft.com/office/drawing/2014/main" id="{D8B70103-11E5-6EFF-3F4E-5B32DD4F7258}"/>
+              </a:ext>
+            </a:extLst>
+          </p:cNvPr>
+          <p:cNvPicPr>
+            <a:picLocks noChangeAspect="1"/>
+          </p:cNvPicPr>
+          <p:nvPr/>
+        </p:nvPicPr>
+        <p:blipFill>
+          <a:blip r:embed="rId4"/>
+          <a:stretch>
+            <a:fillRect/>
+          </a:stretch>
+        </p:blipFill>
+        <p:spPr>
+          <a:xfrm>
+            <a:off x="721211" y="1866769"/>
+            <a:ext cx="4566144" cy="1386150"/>
+          </a:xfrm>
+          <a:prstGeom prst="rect">
+            <a:avLst/>
+          </a:prstGeom>
+        </p:spPr>
+      </p:pic>
+      <p:pic>
+        <p:nvPicPr>
+          <p:cNvPr id="11" name="Picture 10" descr="A rectangular frame with different colored squares&#10;&#10;AI-generated content may be incorrect.">
+            <a:extLst>
+              <a:ext uri="{FF2B5EF4-FFF2-40B4-BE49-F238E27FC236}">
+                <a16:creationId xmlns:a16="http://schemas.microsoft.com/office/drawing/2014/main" id="{92B55E71-7FBD-9F2A-0F8C-2FA23A0B8A13}"/>
+              </a:ext>
+            </a:extLst>
+          </p:cNvPr>
+          <p:cNvPicPr>
+            <a:picLocks noChangeAspect="1"/>
+          </p:cNvPicPr>
+          <p:nvPr/>
+        </p:nvPicPr>
+        <p:blipFill>
+          <a:blip r:embed="rId5"/>
+          <a:stretch>
+            <a:fillRect/>
+          </a:stretch>
+        </p:blipFill>
+        <p:spPr>
+          <a:xfrm>
+            <a:off x="781395" y="3644857"/>
+            <a:ext cx="4505960" cy="1367880"/>
+          </a:xfrm>
+          <a:prstGeom prst="rect">
+            <a:avLst/>
+          </a:prstGeom>
+        </p:spPr>
+      </p:pic>
+      <p:pic>
+        <p:nvPicPr>
+          <p:cNvPr id="14" name="Picture 13" descr="A graph of a number of bars&#10;&#10;AI-generated content may be incorrect.">
+            <a:extLst>
+              <a:ext uri="{FF2B5EF4-FFF2-40B4-BE49-F238E27FC236}">
+                <a16:creationId xmlns:a16="http://schemas.microsoft.com/office/drawing/2014/main" id="{A52745D2-3B5D-0AED-C586-3D84D25688C1}"/>
+              </a:ext>
+            </a:extLst>
+          </p:cNvPr>
+          <p:cNvPicPr>
+            <a:picLocks noChangeAspect="1"/>
+          </p:cNvPicPr>
+          <p:nvPr/>
+        </p:nvPicPr>
+        <p:blipFill>
+          <a:blip r:embed="rId6"/>
+          <a:stretch>
+            <a:fillRect/>
+          </a:stretch>
+        </p:blipFill>
+        <p:spPr>
+          <a:xfrm>
+            <a:off x="157063" y="5157584"/>
+            <a:ext cx="5754624" cy="1616248"/>
+          </a:xfrm>
+          <a:prstGeom prst="rect">
+            <a:avLst/>
+          </a:prstGeom>
+        </p:spPr>
+      </p:pic>
+      <p:pic>
+        <p:nvPicPr>
+          <p:cNvPr id="16" name="Picture 15" descr="A graph of different colored bars&#10;&#10;AI-generated content may be incorrect.">
+            <a:extLst>
+              <a:ext uri="{FF2B5EF4-FFF2-40B4-BE49-F238E27FC236}">
+                <a16:creationId xmlns:a16="http://schemas.microsoft.com/office/drawing/2014/main" id="{14768CE1-0621-33D3-33C9-4C6BEDD7B177}"/>
+              </a:ext>
+            </a:extLst>
+          </p:cNvPr>
+          <p:cNvPicPr>
+            <a:picLocks noChangeAspect="1"/>
+          </p:cNvPicPr>
+          <p:nvPr/>
+        </p:nvPicPr>
+        <p:blipFill>
+          <a:blip r:embed="rId7"/>
+          <a:stretch>
+            <a:fillRect/>
+          </a:stretch>
+        </p:blipFill>
+        <p:spPr>
+          <a:xfrm>
+            <a:off x="5997263" y="5133137"/>
+            <a:ext cx="5496745" cy="1640695"/>
+          </a:xfrm>
+          <a:prstGeom prst="rect">
+            <a:avLst/>
+          </a:prstGeom>
+        </p:spPr>
+      </p:pic>
+    </p:spTree>
+    <p:extLst>
+      <p:ext uri="{BB962C8B-B14F-4D97-AF65-F5344CB8AC3E}">
+        <p14:creationId xmlns:p14="http://schemas.microsoft.com/office/powerpoint/2010/main" val="4159521892"/>
+      </p:ext>
+    </p:extLst>
+  </p:cSld>
+  <p:clrMapOvr>
+    <a:masterClrMapping/>
+  </p:clrMapOvr>
+</p:sld>
+</file>
+
+<file path=ppt/slides/slide14.xml><?xml version="1.0" encoding="utf-8"?>
+<p:sld xmlns:a="http://schemas.openxmlformats.org/drawingml/2006/main" xmlns:r="http://schemas.openxmlformats.org/officeDocument/2006/relationships" xmlns:p="http://schemas.openxmlformats.org/presentationml/2006/main">
+  <p:cSld>
+    <p:spTree>
+      <p:nvGrpSpPr>
+        <p:cNvPr id="1" name=""/>
+        <p:cNvGrpSpPr/>
+        <p:nvPr/>
+      </p:nvGrpSpPr>
+      <p:grpSpPr>
+        <a:xfrm>
+          <a:off x="0" y="0"/>
+          <a:ext cx="0" cy="0"/>
+          <a:chOff x="0" y="0"/>
+          <a:chExt cx="0" cy="0"/>
+        </a:xfrm>
+      </p:grpSpPr>
+      <p:sp>
+        <p:nvSpPr>
+          <p:cNvPr id="2" name="Title 1">
+            <a:extLst>
+              <a:ext uri="{FF2B5EF4-FFF2-40B4-BE49-F238E27FC236}">
+                <a16:creationId xmlns:a16="http://schemas.microsoft.com/office/drawing/2014/main" id="{83B2280F-7108-FFBB-A1A3-8487C7B706DE}"/>
+              </a:ext>
+            </a:extLst>
+          </p:cNvPr>
+          <p:cNvSpPr>
+            <a:spLocks noGrp="1"/>
+          </p:cNvSpPr>
+          <p:nvPr>
+            <p:ph type="title"/>
+          </p:nvPr>
+        </p:nvSpPr>
+        <p:spPr/>
+        <p:txBody>
+          <a:bodyPr/>
+          <a:lstStyle/>
+          <a:p>
+            <a:endParaRPr lang="zh-CN" altLang="en-US"/>
+          </a:p>
+        </p:txBody>
+      </p:sp>
+      <p:sp>
+        <p:nvSpPr>
+          <p:cNvPr id="3" name="Content Placeholder 2">
+            <a:extLst>
+              <a:ext uri="{FF2B5EF4-FFF2-40B4-BE49-F238E27FC236}">
+                <a16:creationId xmlns:a16="http://schemas.microsoft.com/office/drawing/2014/main" id="{1CD9CA06-085B-A597-84B5-712BE3B4644E}"/>
+              </a:ext>
+            </a:extLst>
+          </p:cNvPr>
+          <p:cNvSpPr>
+            <a:spLocks noGrp="1"/>
+          </p:cNvSpPr>
+          <p:nvPr>
+            <p:ph idx="1"/>
+          </p:nvPr>
+        </p:nvSpPr>
+        <p:spPr/>
+        <p:txBody>
+          <a:bodyPr/>
+          <a:lstStyle/>
+          <a:p>
+            <a:endParaRPr lang="zh-CN" altLang="en-US"/>
+          </a:p>
+        </p:txBody>
+      </p:sp>
+      <p:pic>
+        <p:nvPicPr>
+          <p:cNvPr id="5" name="Picture 4" descr="A chart with numbers and a bar&#10;&#10;AI-generated content may be incorrect.">
+            <a:extLst>
+              <a:ext uri="{FF2B5EF4-FFF2-40B4-BE49-F238E27FC236}">
+                <a16:creationId xmlns:a16="http://schemas.microsoft.com/office/drawing/2014/main" id="{02D91553-28BC-1175-A255-E56B6529581A}"/>
+              </a:ext>
+            </a:extLst>
+          </p:cNvPr>
+          <p:cNvPicPr>
+            <a:picLocks noChangeAspect="1"/>
+          </p:cNvPicPr>
+          <p:nvPr/>
+        </p:nvPicPr>
+        <p:blipFill>
+          <a:blip r:embed="rId2"/>
+          <a:stretch>
+            <a:fillRect/>
+          </a:stretch>
+        </p:blipFill>
+        <p:spPr>
+          <a:xfrm>
+            <a:off x="584668" y="0"/>
+            <a:ext cx="10583752" cy="3343742"/>
+          </a:xfrm>
+          <a:prstGeom prst="rect">
+            <a:avLst/>
+          </a:prstGeom>
+        </p:spPr>
+      </p:pic>
+      <p:pic>
+        <p:nvPicPr>
+          <p:cNvPr id="9" name="Picture 8" descr="A screenshot of a graph&#10;&#10;AI-generated content may be incorrect.">
+            <a:extLst>
+              <a:ext uri="{FF2B5EF4-FFF2-40B4-BE49-F238E27FC236}">
+                <a16:creationId xmlns:a16="http://schemas.microsoft.com/office/drawing/2014/main" id="{BDFE939F-C3F9-52FE-8417-52C96748AA7A}"/>
+              </a:ext>
+            </a:extLst>
+          </p:cNvPr>
+          <p:cNvPicPr>
+            <a:picLocks noChangeAspect="1"/>
+          </p:cNvPicPr>
+          <p:nvPr/>
+        </p:nvPicPr>
+        <p:blipFill>
+          <a:blip r:embed="rId3"/>
+          <a:stretch>
+            <a:fillRect/>
+          </a:stretch>
+        </p:blipFill>
+        <p:spPr>
+          <a:xfrm>
+            <a:off x="255626" y="3193272"/>
+            <a:ext cx="11098174" cy="3134162"/>
+          </a:xfrm>
+          <a:prstGeom prst="rect">
+            <a:avLst/>
+          </a:prstGeom>
+        </p:spPr>
+      </p:pic>
+      <p:pic>
+        <p:nvPicPr>
+          <p:cNvPr id="10" name="Picture 9">
+            <a:extLst>
+              <a:ext uri="{FF2B5EF4-FFF2-40B4-BE49-F238E27FC236}">
+                <a16:creationId xmlns:a16="http://schemas.microsoft.com/office/drawing/2014/main" id="{3A3B56F4-CD1B-8FA9-68C1-7BBCECDCD610}"/>
+              </a:ext>
+            </a:extLst>
+          </p:cNvPr>
+          <p:cNvPicPr>
+            <a:picLocks noChangeAspect="1"/>
+          </p:cNvPicPr>
+          <p:nvPr/>
+        </p:nvPicPr>
+        <p:blipFill>
+          <a:blip r:embed="rId4"/>
+          <a:stretch>
+            <a:fillRect/>
+          </a:stretch>
+        </p:blipFill>
+        <p:spPr>
+          <a:xfrm>
+            <a:off x="5858255" y="3895833"/>
+            <a:ext cx="5176655" cy="1407687"/>
+          </a:xfrm>
+          <a:prstGeom prst="rect">
+            <a:avLst/>
+          </a:prstGeom>
+        </p:spPr>
+      </p:pic>
+      <p:pic>
+        <p:nvPicPr>
+          <p:cNvPr id="12" name="Picture 11" descr="A screenshot of a computer&#10;&#10;AI-generated content may be incorrect.">
+            <a:extLst>
+              <a:ext uri="{FF2B5EF4-FFF2-40B4-BE49-F238E27FC236}">
+                <a16:creationId xmlns:a16="http://schemas.microsoft.com/office/drawing/2014/main" id="{785D1F16-0842-DFF7-37E9-EE5754F32183}"/>
+              </a:ext>
+            </a:extLst>
+          </p:cNvPr>
+          <p:cNvPicPr>
+            <a:picLocks noChangeAspect="1"/>
+          </p:cNvPicPr>
+          <p:nvPr/>
+        </p:nvPicPr>
+        <p:blipFill>
+          <a:blip r:embed="rId5"/>
+          <a:stretch>
+            <a:fillRect/>
+          </a:stretch>
+        </p:blipFill>
+        <p:spPr>
+          <a:xfrm>
+            <a:off x="5488590" y="917216"/>
+            <a:ext cx="5772520" cy="1358841"/>
+          </a:xfrm>
+          <a:prstGeom prst="rect">
+            <a:avLst/>
+          </a:prstGeom>
+        </p:spPr>
+      </p:pic>
+      <p:pic>
+        <p:nvPicPr>
+          <p:cNvPr id="14" name="Picture 13" descr="A screen shot of a graph&#10;&#10;AI-generated content may be incorrect.">
+            <a:extLst>
+              <a:ext uri="{FF2B5EF4-FFF2-40B4-BE49-F238E27FC236}">
+                <a16:creationId xmlns:a16="http://schemas.microsoft.com/office/drawing/2014/main" id="{3A33534B-18EE-76D8-A1CD-8071784F7D31}"/>
+              </a:ext>
+            </a:extLst>
+          </p:cNvPr>
+          <p:cNvPicPr>
+            <a:picLocks noChangeAspect="1"/>
+          </p:cNvPicPr>
+          <p:nvPr/>
+        </p:nvPicPr>
+        <p:blipFill>
+          <a:blip r:embed="rId6"/>
+          <a:stretch>
+            <a:fillRect/>
+          </a:stretch>
+        </p:blipFill>
+        <p:spPr>
+          <a:xfrm>
+            <a:off x="-409782" y="-94714"/>
+            <a:ext cx="8421275" cy="3705742"/>
+          </a:xfrm>
+          <a:prstGeom prst="rect">
+            <a:avLst/>
+          </a:prstGeom>
+        </p:spPr>
+      </p:pic>
+      <p:pic>
+        <p:nvPicPr>
+          <p:cNvPr id="16" name="Picture 15" descr="A graph of a graph&#10;&#10;AI-generated content may be incorrect.">
+            <a:extLst>
+              <a:ext uri="{FF2B5EF4-FFF2-40B4-BE49-F238E27FC236}">
+                <a16:creationId xmlns:a16="http://schemas.microsoft.com/office/drawing/2014/main" id="{2D322ACE-1CB2-7669-58D2-6D39BB42C935}"/>
+              </a:ext>
+            </a:extLst>
+          </p:cNvPr>
+          <p:cNvPicPr>
+            <a:picLocks noChangeAspect="1"/>
+          </p:cNvPicPr>
+          <p:nvPr/>
+        </p:nvPicPr>
+        <p:blipFill>
+          <a:blip r:embed="rId7"/>
+          <a:stretch>
+            <a:fillRect/>
+          </a:stretch>
+        </p:blipFill>
+        <p:spPr>
+          <a:xfrm>
+            <a:off x="-321390" y="2214285"/>
+            <a:ext cx="7961531" cy="4770782"/>
+          </a:xfrm>
+          <a:prstGeom prst="rect">
+            <a:avLst/>
+          </a:prstGeom>
+        </p:spPr>
+      </p:pic>
+      <p:cxnSp>
+        <p:nvCxnSpPr>
+          <p:cNvPr id="18" name="Straight Connector 17">
+            <a:extLst>
+              <a:ext uri="{FF2B5EF4-FFF2-40B4-BE49-F238E27FC236}">
+                <a16:creationId xmlns:a16="http://schemas.microsoft.com/office/drawing/2014/main" id="{DAB99E09-0862-8BE4-A22B-2B290B893D99}"/>
+              </a:ext>
+            </a:extLst>
+          </p:cNvPr>
+          <p:cNvCxnSpPr/>
+          <p:nvPr/>
+        </p:nvCxnSpPr>
+        <p:spPr>
+          <a:xfrm>
+            <a:off x="6419088" y="761554"/>
+            <a:ext cx="0" cy="5565880"/>
+          </a:xfrm>
+          <a:prstGeom prst="line">
+            <a:avLst/>
+          </a:prstGeom>
+        </p:spPr>
+        <p:style>
+          <a:lnRef idx="2">
+            <a:schemeClr val="accent1"/>
+          </a:lnRef>
+          <a:fillRef idx="0">
+            <a:schemeClr val="accent1"/>
+          </a:fillRef>
+          <a:effectRef idx="1">
+            <a:schemeClr val="accent1"/>
+          </a:effectRef>
+          <a:fontRef idx="minor">
+            <a:schemeClr val="tx1"/>
+          </a:fontRef>
+        </p:style>
+      </p:cxnSp>
+      <p:cxnSp>
+        <p:nvCxnSpPr>
+          <p:cNvPr id="19" name="Straight Connector 18">
+            <a:extLst>
+              <a:ext uri="{FF2B5EF4-FFF2-40B4-BE49-F238E27FC236}">
+                <a16:creationId xmlns:a16="http://schemas.microsoft.com/office/drawing/2014/main" id="{06E71C9D-A3F0-8F05-6E5B-305B73732D6B}"/>
+              </a:ext>
+            </a:extLst>
+          </p:cNvPr>
+          <p:cNvCxnSpPr/>
+          <p:nvPr/>
+        </p:nvCxnSpPr>
+        <p:spPr>
+          <a:xfrm>
+            <a:off x="3938016" y="560802"/>
+            <a:ext cx="0" cy="5565880"/>
+          </a:xfrm>
+          <a:prstGeom prst="line">
+            <a:avLst/>
+          </a:prstGeom>
+        </p:spPr>
+        <p:style>
+          <a:lnRef idx="2">
+            <a:schemeClr val="accent1"/>
+          </a:lnRef>
+          <a:fillRef idx="0">
+            <a:schemeClr val="accent1"/>
+          </a:fillRef>
+          <a:effectRef idx="1">
+            <a:schemeClr val="accent1"/>
+          </a:effectRef>
+          <a:fontRef idx="minor">
+            <a:schemeClr val="tx1"/>
+          </a:fontRef>
+        </p:style>
+      </p:cxnSp>
+    </p:spTree>
+    <p:extLst>
+      <p:ext uri="{BB962C8B-B14F-4D97-AF65-F5344CB8AC3E}">
+        <p14:creationId xmlns:p14="http://schemas.microsoft.com/office/powerpoint/2010/main" val="3160060896"/>
+      </p:ext>
+    </p:extLst>
+  </p:cSld>
+  <p:clrMapOvr>
+    <a:masterClrMapping/>
+  </p:clrMapOvr>
+</p:sld>
+</file>
+
+<file path=ppt/slides/slide15.xml><?xml version="1.0" encoding="utf-8"?>
+<p:sld xmlns:a="http://schemas.openxmlformats.org/drawingml/2006/main" xmlns:r="http://schemas.openxmlformats.org/officeDocument/2006/relationships" xmlns:p="http://schemas.openxmlformats.org/presentationml/2006/main">
+  <p:cSld>
+    <p:spTree>
+      <p:nvGrpSpPr>
+        <p:cNvPr id="1" name=""/>
+        <p:cNvGrpSpPr/>
+        <p:nvPr/>
+      </p:nvGrpSpPr>
+      <p:grpSpPr>
+        <a:xfrm>
+          <a:off x="0" y="0"/>
+          <a:ext cx="0" cy="0"/>
+          <a:chOff x="0" y="0"/>
+          <a:chExt cx="0" cy="0"/>
+        </a:xfrm>
+      </p:grpSpPr>
+      <p:sp>
+        <p:nvSpPr>
+          <p:cNvPr id="2" name="Title 1">
+            <a:extLst>
+              <a:ext uri="{FF2B5EF4-FFF2-40B4-BE49-F238E27FC236}">
+                <a16:creationId xmlns:a16="http://schemas.microsoft.com/office/drawing/2014/main" id="{462401AF-06F7-E362-7437-689BCCCDE694}"/>
+              </a:ext>
+            </a:extLst>
+          </p:cNvPr>
+          <p:cNvSpPr>
+            <a:spLocks noGrp="1"/>
+          </p:cNvSpPr>
+          <p:nvPr>
+            <p:ph type="title"/>
+          </p:nvPr>
+        </p:nvSpPr>
+        <p:spPr/>
+        <p:txBody>
+          <a:bodyPr/>
+          <a:lstStyle/>
+          <a:p>
+            <a:endParaRPr lang="zh-CN" altLang="en-US"/>
+          </a:p>
+        </p:txBody>
+      </p:sp>
+      <p:pic>
+        <p:nvPicPr>
+          <p:cNvPr id="5" name="Picture 4">
+            <a:extLst>
+              <a:ext uri="{FF2B5EF4-FFF2-40B4-BE49-F238E27FC236}">
+                <a16:creationId xmlns:a16="http://schemas.microsoft.com/office/drawing/2014/main" id="{7A739E1C-9AC3-8F62-F056-A779662A334F}"/>
+              </a:ext>
+            </a:extLst>
+          </p:cNvPr>
+          <p:cNvPicPr>
+            <a:picLocks noChangeAspect="1"/>
+          </p:cNvPicPr>
+          <p:nvPr/>
+        </p:nvPicPr>
+        <p:blipFill>
+          <a:blip r:embed="rId2"/>
+          <a:stretch>
+            <a:fillRect/>
+          </a:stretch>
+        </p:blipFill>
+        <p:spPr>
+          <a:xfrm>
+            <a:off x="1498861" y="175676"/>
+            <a:ext cx="7810793" cy="2293204"/>
+          </a:xfrm>
+          <a:prstGeom prst="rect">
+            <a:avLst/>
+          </a:prstGeom>
+        </p:spPr>
+      </p:pic>
+      <p:sp>
+        <p:nvSpPr>
+          <p:cNvPr id="7" name="TextBox 6">
+            <a:extLst>
+              <a:ext uri="{FF2B5EF4-FFF2-40B4-BE49-F238E27FC236}">
+                <a16:creationId xmlns:a16="http://schemas.microsoft.com/office/drawing/2014/main" id="{9FA75821-797A-3AD0-4CDB-2A3DB5566C80}"/>
+              </a:ext>
+            </a:extLst>
+          </p:cNvPr>
+          <p:cNvSpPr txBox="1"/>
+          <p:nvPr/>
+        </p:nvSpPr>
+        <p:spPr>
+          <a:xfrm>
+            <a:off x="7167880" y="731966"/>
+            <a:ext cx="2026920" cy="338554"/>
+          </a:xfrm>
+          <a:prstGeom prst="rect">
+            <a:avLst/>
+          </a:prstGeom>
+          <a:noFill/>
+        </p:spPr>
+        <p:txBody>
+          <a:bodyPr wrap="square">
+            <a:spAutoFit/>
+          </a:bodyPr>
+          <a:lstStyle/>
+          <a:p>
+            <a:r>
+              <a:rPr lang="en-US" altLang="zh-CN" sz="1600" b="0" i="0" u="none" strike="noStrike" baseline="0" dirty="0">
+                <a:latin typeface="ArialMT"/>
+              </a:rPr>
+              <a:t>L(2, ):U(1,2):R(5,)</a:t>
+            </a:r>
+            <a:endParaRPr lang="zh-CN" altLang="en-US" sz="4400" dirty="0"/>
+          </a:p>
+        </p:txBody>
+      </p:sp>
+      <p:pic>
+        <p:nvPicPr>
+          <p:cNvPr id="9" name="Picture 8" descr="A screenshot of a graph&#10;&#10;AI-generated content may be incorrect.">
+            <a:extLst>
+              <a:ext uri="{FF2B5EF4-FFF2-40B4-BE49-F238E27FC236}">
+                <a16:creationId xmlns:a16="http://schemas.microsoft.com/office/drawing/2014/main" id="{30147F23-ECFE-798B-BECB-2672C35AFC23}"/>
+              </a:ext>
+            </a:extLst>
+          </p:cNvPr>
+          <p:cNvPicPr>
+            <a:picLocks noChangeAspect="1"/>
+          </p:cNvPicPr>
+          <p:nvPr/>
+        </p:nvPicPr>
+        <p:blipFill>
+          <a:blip r:embed="rId3"/>
+          <a:stretch>
+            <a:fillRect/>
+          </a:stretch>
+        </p:blipFill>
+        <p:spPr>
+          <a:xfrm>
+            <a:off x="838200" y="3261359"/>
+            <a:ext cx="4699876" cy="2967915"/>
+          </a:xfrm>
+          <a:prstGeom prst="rect">
+            <a:avLst/>
+          </a:prstGeom>
+        </p:spPr>
+      </p:pic>
+      <p:sp>
+        <p:nvSpPr>
+          <p:cNvPr id="10" name="TextBox 9">
+            <a:extLst>
+              <a:ext uri="{FF2B5EF4-FFF2-40B4-BE49-F238E27FC236}">
+                <a16:creationId xmlns:a16="http://schemas.microsoft.com/office/drawing/2014/main" id="{DF165B89-15D0-EA08-EB10-521E542ADA5A}"/>
+              </a:ext>
+            </a:extLst>
+          </p:cNvPr>
+          <p:cNvSpPr txBox="1"/>
+          <p:nvPr/>
+        </p:nvSpPr>
+        <p:spPr>
+          <a:xfrm>
+            <a:off x="5538076" y="3815080"/>
+            <a:ext cx="1447832" cy="646331"/>
+          </a:xfrm>
+          <a:prstGeom prst="rect">
+            <a:avLst/>
+          </a:prstGeom>
+          <a:noFill/>
+        </p:spPr>
+        <p:txBody>
+          <a:bodyPr wrap="none" rtlCol="0">
+            <a:spAutoFit/>
+          </a:bodyPr>
+          <a:lstStyle/>
+          <a:p>
+            <a:r>
+              <a:rPr lang="en-US" altLang="zh-CN" dirty="0"/>
+              <a:t>Del:rep:2:5+</a:t>
+            </a:r>
+          </a:p>
+          <a:p>
+            <a:r>
+              <a:rPr lang="en-US" altLang="zh-CN" dirty="0"/>
+              <a:t>Del:rep:2:4</a:t>
+            </a:r>
+            <a:endParaRPr lang="zh-CN" altLang="en-US" dirty="0"/>
+          </a:p>
+        </p:txBody>
+      </p:sp>
+      <p:sp>
+        <p:nvSpPr>
+          <p:cNvPr id="11" name="TextBox 10">
+            <a:extLst>
+              <a:ext uri="{FF2B5EF4-FFF2-40B4-BE49-F238E27FC236}">
+                <a16:creationId xmlns:a16="http://schemas.microsoft.com/office/drawing/2014/main" id="{DC39A7A7-8C9B-0C01-0B24-DFD89EA3A4BC}"/>
+              </a:ext>
+            </a:extLst>
+          </p:cNvPr>
+          <p:cNvSpPr txBox="1"/>
+          <p:nvPr/>
+        </p:nvSpPr>
+        <p:spPr>
+          <a:xfrm>
+            <a:off x="5502516" y="5311505"/>
+            <a:ext cx="1447832" cy="923330"/>
+          </a:xfrm>
+          <a:prstGeom prst="rect">
+            <a:avLst/>
+          </a:prstGeom>
+          <a:noFill/>
+        </p:spPr>
+        <p:txBody>
+          <a:bodyPr wrap="none" rtlCol="0">
+            <a:spAutoFit/>
+          </a:bodyPr>
+          <a:lstStyle/>
+          <a:p>
+            <a:r>
+              <a:rPr lang="en-US" altLang="zh-CN" dirty="0"/>
+              <a:t>Del:rep:2:5+</a:t>
+            </a:r>
+          </a:p>
+          <a:p>
+            <a:r>
+              <a:rPr lang="en-US" altLang="zh-CN" dirty="0"/>
+              <a:t>Del:rep:2:4,</a:t>
+            </a:r>
+          </a:p>
+          <a:p>
+            <a:r>
+              <a:rPr lang="en-US" altLang="zh-CN" dirty="0"/>
+              <a:t>Del:rep:3:3</a:t>
+            </a:r>
+            <a:endParaRPr lang="zh-CN" altLang="en-US" dirty="0"/>
+          </a:p>
+        </p:txBody>
+      </p:sp>
+      <p:sp>
+        <p:nvSpPr>
+          <p:cNvPr id="13" name="TextBox 12">
+            <a:extLst>
+              <a:ext uri="{FF2B5EF4-FFF2-40B4-BE49-F238E27FC236}">
+                <a16:creationId xmlns:a16="http://schemas.microsoft.com/office/drawing/2014/main" id="{87F8F784-92C0-BC3D-2B4C-F6C83884728D}"/>
+              </a:ext>
+            </a:extLst>
+          </p:cNvPr>
+          <p:cNvSpPr txBox="1"/>
+          <p:nvPr/>
+        </p:nvSpPr>
+        <p:spPr>
+          <a:xfrm>
+            <a:off x="9470028" y="5502086"/>
+            <a:ext cx="2026920" cy="338554"/>
+          </a:xfrm>
+          <a:prstGeom prst="rect">
+            <a:avLst/>
+          </a:prstGeom>
+          <a:noFill/>
+        </p:spPr>
+        <p:txBody>
+          <a:bodyPr wrap="square">
+            <a:spAutoFit/>
+          </a:bodyPr>
+          <a:lstStyle/>
+          <a:p>
+            <a:r>
+              <a:rPr lang="en-US" altLang="zh-CN" sz="1600" b="0" i="0" u="none" strike="noStrike" baseline="0" dirty="0">
+                <a:latin typeface="ArialMT"/>
+              </a:rPr>
+              <a:t>L(2, ):U(1,2):R(5,)</a:t>
+            </a:r>
+            <a:endParaRPr lang="zh-CN" altLang="en-US" sz="4400" dirty="0"/>
+          </a:p>
+        </p:txBody>
+      </p:sp>
+      <p:sp>
+        <p:nvSpPr>
+          <p:cNvPr id="14" name="TextBox 13">
+            <a:extLst>
+              <a:ext uri="{FF2B5EF4-FFF2-40B4-BE49-F238E27FC236}">
+                <a16:creationId xmlns:a16="http://schemas.microsoft.com/office/drawing/2014/main" id="{31C22A44-E617-1903-EFE4-E5A51FA2B6A3}"/>
+              </a:ext>
+            </a:extLst>
+          </p:cNvPr>
+          <p:cNvSpPr txBox="1"/>
+          <p:nvPr/>
+        </p:nvSpPr>
+        <p:spPr>
+          <a:xfrm>
+            <a:off x="7107828" y="3968968"/>
+            <a:ext cx="2026920" cy="338554"/>
+          </a:xfrm>
+          <a:prstGeom prst="rect">
+            <a:avLst/>
+          </a:prstGeom>
+          <a:noFill/>
+        </p:spPr>
+        <p:txBody>
+          <a:bodyPr wrap="square">
+            <a:spAutoFit/>
+          </a:bodyPr>
+          <a:lstStyle/>
+          <a:p>
+            <a:r>
+              <a:rPr lang="en-US" altLang="zh-CN" sz="1600" b="0" i="0" u="none" strike="noStrike" baseline="0">
+                <a:latin typeface="ArialMT"/>
+              </a:rPr>
+              <a:t>L(2, ):U(1,2):R(5,)</a:t>
+            </a:r>
+            <a:endParaRPr lang="zh-CN" altLang="en-US" sz="4400" dirty="0"/>
+          </a:p>
+        </p:txBody>
+      </p:sp>
+      <p:sp>
+        <p:nvSpPr>
+          <p:cNvPr id="16" name="TextBox 15">
+            <a:extLst>
+              <a:ext uri="{FF2B5EF4-FFF2-40B4-BE49-F238E27FC236}">
+                <a16:creationId xmlns:a16="http://schemas.microsoft.com/office/drawing/2014/main" id="{D28E62B2-6BF1-708C-96E5-9ED0C1210D6C}"/>
+              </a:ext>
+            </a:extLst>
+          </p:cNvPr>
+          <p:cNvSpPr txBox="1"/>
+          <p:nvPr/>
+        </p:nvSpPr>
+        <p:spPr>
+          <a:xfrm>
+            <a:off x="6940188" y="5886092"/>
+            <a:ext cx="2037080" cy="369332"/>
+          </a:xfrm>
+          <a:prstGeom prst="rect">
+            <a:avLst/>
+          </a:prstGeom>
+          <a:noFill/>
+        </p:spPr>
+        <p:txBody>
+          <a:bodyPr wrap="square">
+            <a:spAutoFit/>
+          </a:bodyPr>
+          <a:lstStyle/>
+          <a:p>
+            <a:r>
+              <a:rPr lang="en-US" altLang="zh-CN" b="0" i="0" dirty="0">
+                <a:solidFill>
+                  <a:srgbClr val="586E75"/>
+                </a:solidFill>
+                <a:effectLst/>
+                <a:latin typeface="DejaVu Sans"/>
+              </a:rPr>
+              <a:t>Del3:U1:R(5,9)</a:t>
+            </a:r>
+            <a:endParaRPr lang="zh-CN" altLang="en-US" dirty="0"/>
+          </a:p>
+        </p:txBody>
+      </p:sp>
+    </p:spTree>
+    <p:extLst>
+      <p:ext uri="{BB962C8B-B14F-4D97-AF65-F5344CB8AC3E}">
+        <p14:creationId xmlns:p14="http://schemas.microsoft.com/office/powerpoint/2010/main" val="1251832064"/>
       </p:ext>
     </p:extLst>
   </p:cSld>

</xml_diff>